<commit_message>
change slide flutter 1
</commit_message>
<xml_diff>
--- a/buoi2_basicdart/[2- Flutter] Basic dart 1.pptx
+++ b/buoi2_basicdart/[2- Flutter] Basic dart 1.pptx
@@ -4788,7 +4788,7 @@
         </p:nvSpPr>
         <p:spPr>
           <a:xfrm>
-            <a:off x="4839566" y="185530"/>
+            <a:off x="5221080" y="185530"/>
             <a:ext cx="1749838" cy="461665"/>
           </a:xfrm>
           <a:prstGeom prst="rect">
@@ -4811,10 +4811,10 @@
       </p:sp>
       <p:sp>
         <p:nvSpPr>
-          <p:cNvPr id="4" name="TextBox 3">
-            <a:extLst>
-              <a:ext uri="{FF2B5EF4-FFF2-40B4-BE49-F238E27FC236}">
-                <a16:creationId xmlns:a16="http://schemas.microsoft.com/office/drawing/2014/main" id="{3E24E9F8-B79F-AC4F-B096-0F0E6D2EA775}"/>
+          <p:cNvPr id="5" name="TextBox 4">
+            <a:extLst>
+              <a:ext uri="{FF2B5EF4-FFF2-40B4-BE49-F238E27FC236}">
+                <a16:creationId xmlns:a16="http://schemas.microsoft.com/office/drawing/2014/main" id="{A766431B-E379-2B42-BBF1-73FEA4991301}"/>
               </a:ext>
             </a:extLst>
           </p:cNvPr>
@@ -4823,8 +4823,8 @@
         </p:nvSpPr>
         <p:spPr>
           <a:xfrm>
-            <a:off x="393463" y="859298"/>
-            <a:ext cx="11399143" cy="5122941"/>
+            <a:off x="374754" y="839449"/>
+            <a:ext cx="11399143" cy="5632311"/>
           </a:xfrm>
           <a:prstGeom prst="rect">
             <a:avLst/>
@@ -4837,256 +4837,302 @@
           </a:bodyPr>
           <a:lstStyle/>
           <a:p>
-            <a:pPr>
-              <a:lnSpc>
-                <a:spcPct val="150000"/>
-              </a:lnSpc>
+            <a:r>
+              <a:rPr lang="en-VN" b="1" dirty="0"/>
+              <a:t>Kiến thức: </a:t>
+            </a:r>
+          </a:p>
+          <a:p>
+            <a:r>
+              <a:rPr lang="en-VN" dirty="0"/>
+              <a:t>- TÌm hiểu về các phép toán trong dart:Chỉ phần </a:t>
+            </a:r>
+            <a:r>
+              <a:rPr lang="en-US" b="1" dirty="0"/>
+              <a:t>Arithmetic Operators </a:t>
+            </a:r>
+            <a:r>
+              <a:rPr lang="en-US" b="1" dirty="0" err="1"/>
+              <a:t>và</a:t>
+            </a:r>
+            <a:r>
+              <a:rPr lang="en-US" b="1" dirty="0"/>
+              <a:t> Equality and Relational Operators</a:t>
+            </a:r>
+          </a:p>
+          <a:p>
+            <a:r>
+              <a:rPr lang="en-VN" dirty="0"/>
+              <a:t> </a:t>
+            </a:r>
+            <a:r>
+              <a:rPr lang="en-US" dirty="0">
+                <a:hlinkClick r:id="rId2"/>
+              </a:rPr>
+              <a:t>https://www.tutorialspoint.com/dart_programming/dart_programming_operators.htm</a:t>
+            </a:r>
+            <a:endParaRPr lang="en-US" dirty="0"/>
+          </a:p>
+          <a:p>
+            <a:pPr marL="285750" indent="-285750">
+              <a:buFontTx/>
+              <a:buChar char="-"/>
             </a:pPr>
             <a:r>
-              <a:rPr lang="en-VN" sz="2000" dirty="0"/>
+              <a:rPr lang="en-US" dirty="0" err="1"/>
+              <a:t>Tìm</a:t>
+            </a:r>
+            <a:r>
+              <a:rPr lang="en-US" dirty="0"/>
+              <a:t> </a:t>
+            </a:r>
+            <a:r>
+              <a:rPr lang="en-US" dirty="0" err="1"/>
+              <a:t>hiểu</a:t>
+            </a:r>
+            <a:r>
+              <a:rPr lang="en-US" dirty="0"/>
+              <a:t> </a:t>
+            </a:r>
+            <a:r>
+              <a:rPr lang="en-US" dirty="0" err="1"/>
+              <a:t>về</a:t>
+            </a:r>
+            <a:r>
+              <a:rPr lang="en-US" dirty="0"/>
+              <a:t> if – else:</a:t>
+            </a:r>
+          </a:p>
+          <a:p>
+            <a:r>
+              <a:rPr lang="en-US" dirty="0">
+                <a:hlinkClick r:id="rId3"/>
+              </a:rPr>
+              <a:t>https://www.tutorialspoint.com/dart_programming/dart_programming_if_statement.htm</a:t>
+            </a:r>
+            <a:endParaRPr lang="en-US" dirty="0"/>
+          </a:p>
+          <a:p>
+            <a:r>
+              <a:rPr lang="en-US" dirty="0">
+                <a:hlinkClick r:id="rId4"/>
+              </a:rPr>
+              <a:t>https://www.tutorialspoint.com/dart_programming/dart_programming_if_else_statement.htm</a:t>
+            </a:r>
+            <a:endParaRPr lang="en-US" dirty="0"/>
+          </a:p>
+          <a:p>
+            <a:endParaRPr lang="en-US" dirty="0"/>
+          </a:p>
+          <a:p>
+            <a:r>
+              <a:rPr lang="en-US" b="1" dirty="0" err="1"/>
+              <a:t>Bài</a:t>
+            </a:r>
+            <a:r>
+              <a:rPr lang="en-US" b="1" dirty="0"/>
+              <a:t> </a:t>
+            </a:r>
+            <a:r>
+              <a:rPr lang="en-US" b="1" dirty="0" err="1"/>
+              <a:t>tập</a:t>
+            </a:r>
+            <a:r>
+              <a:rPr lang="en-US" b="1" dirty="0"/>
+              <a:t>:</a:t>
+            </a:r>
+          </a:p>
+          <a:p>
+            <a:r>
+              <a:rPr lang="en-VN" dirty="0"/>
               <a:t>1. Viết chương trình in ra kết quả nhân 2 số nguyên.</a:t>
             </a:r>
           </a:p>
           <a:p>
-            <a:pPr>
-              <a:lnSpc>
-                <a:spcPct val="150000"/>
-              </a:lnSpc>
-            </a:pPr>
-            <a:r>
-              <a:rPr lang="en-VN" sz="2000" dirty="0"/>
+            <a:r>
+              <a:rPr lang="en-VN" dirty="0"/>
               <a:t>2. </a:t>
             </a:r>
             <a:r>
-              <a:rPr lang="en-US" sz="2000" dirty="0" err="1"/>
+              <a:rPr lang="en-US" dirty="0" err="1"/>
               <a:t>Kiểm</a:t>
             </a:r>
             <a:r>
-              <a:rPr lang="en-US" sz="2000" dirty="0"/>
+              <a:rPr lang="en-US" dirty="0"/>
               <a:t> </a:t>
             </a:r>
             <a:r>
-              <a:rPr lang="en-US" sz="2000" dirty="0" err="1"/>
+              <a:rPr lang="en-US" dirty="0" err="1"/>
               <a:t>tra</a:t>
             </a:r>
             <a:r>
-              <a:rPr lang="en-US" sz="2000" dirty="0"/>
+              <a:rPr lang="en-US" dirty="0"/>
               <a:t> 1 </a:t>
             </a:r>
             <a:r>
-              <a:rPr lang="en-US" sz="2000" dirty="0" err="1"/>
+              <a:rPr lang="en-US" dirty="0" err="1"/>
               <a:t>chuỗi</a:t>
             </a:r>
             <a:r>
-              <a:rPr lang="en-US" sz="2000" dirty="0"/>
+              <a:rPr lang="en-US" dirty="0"/>
               <a:t> </a:t>
             </a:r>
             <a:r>
-              <a:rPr lang="en-US" sz="2000" dirty="0" err="1"/>
+              <a:rPr lang="en-US" dirty="0" err="1"/>
               <a:t>bất</a:t>
             </a:r>
             <a:r>
-              <a:rPr lang="en-US" sz="2000" dirty="0"/>
+              <a:rPr lang="en-US" dirty="0"/>
               <a:t> </a:t>
             </a:r>
             <a:r>
-              <a:rPr lang="en-US" sz="2000" dirty="0" err="1"/>
+              <a:rPr lang="en-US" dirty="0" err="1"/>
               <a:t>kỳ</a:t>
             </a:r>
             <a:r>
-              <a:rPr lang="en-US" sz="2000" dirty="0"/>
+              <a:rPr lang="en-US" dirty="0"/>
               <a:t> </a:t>
             </a:r>
             <a:r>
-              <a:rPr lang="en-US" sz="2000" dirty="0" err="1"/>
+              <a:rPr lang="en-US" dirty="0" err="1"/>
               <a:t>có</a:t>
             </a:r>
             <a:r>
-              <a:rPr lang="en-US" sz="2000" dirty="0"/>
+              <a:rPr lang="en-US" dirty="0"/>
               <a:t> </a:t>
             </a:r>
             <a:r>
-              <a:rPr lang="en-US" sz="2000" dirty="0" err="1"/>
+              <a:rPr lang="en-US" dirty="0" err="1"/>
               <a:t>rỗng</a:t>
             </a:r>
             <a:r>
-              <a:rPr lang="en-US" sz="2000" dirty="0"/>
+              <a:rPr lang="en-US" dirty="0"/>
               <a:t> hay </a:t>
             </a:r>
             <a:r>
-              <a:rPr lang="en-US" sz="2000" dirty="0" err="1"/>
+              <a:rPr lang="en-US" dirty="0" err="1"/>
               <a:t>không</a:t>
             </a:r>
             <a:r>
-              <a:rPr lang="en-US" sz="2000" dirty="0"/>
+              <a:rPr lang="en-US" dirty="0"/>
               <a:t>.</a:t>
             </a:r>
-            <a:endParaRPr lang="en-VN" sz="2000" dirty="0"/>
-          </a:p>
-          <a:p>
-            <a:pPr>
-              <a:lnSpc>
-                <a:spcPct val="150000"/>
-              </a:lnSpc>
-            </a:pPr>
-            <a:r>
-              <a:rPr lang="en-VN" sz="2000" dirty="0"/>
+            <a:endParaRPr lang="en-VN" dirty="0"/>
+          </a:p>
+          <a:p>
+            <a:r>
+              <a:rPr lang="en-VN" dirty="0"/>
               <a:t>3. Chuyển 1 chuỗi bất kỳ thành 1 chuỗi viết Hoa.</a:t>
             </a:r>
           </a:p>
           <a:p>
-            <a:pPr>
-              <a:lnSpc>
-                <a:spcPct val="150000"/>
-              </a:lnSpc>
-            </a:pPr>
-            <a:r>
-              <a:rPr lang="en-VN" sz="2000" dirty="0"/>
+            <a:r>
+              <a:rPr lang="en-VN" dirty="0"/>
               <a:t>4. Cho 1 mảng [1,2,3, 4]. Hãy xử lý để mảng trở thành [1,0,0,4]</a:t>
             </a:r>
           </a:p>
           <a:p>
-            <a:pPr>
-              <a:lnSpc>
-                <a:spcPct val="150000"/>
-              </a:lnSpc>
-            </a:pPr>
-            <a:r>
-              <a:rPr lang="en-VN" sz="2000" dirty="0"/>
+            <a:r>
+              <a:rPr lang="en-VN" dirty="0"/>
               <a:t>5. Viết function tính tổng 2 số thực.</a:t>
             </a:r>
           </a:p>
           <a:p>
-            <a:pPr>
-              <a:lnSpc>
-                <a:spcPct val="150000"/>
-              </a:lnSpc>
-            </a:pPr>
-            <a:r>
-              <a:rPr lang="en-VN" sz="2000" dirty="0"/>
-              <a:t>6. . </a:t>
-            </a:r>
-            <a:r>
-              <a:rPr lang="en-VN" sz="2000"/>
-              <a:t>Viết function tính thương </a:t>
-            </a:r>
-            <a:r>
-              <a:rPr lang="en-VN" sz="2000" dirty="0"/>
-              <a:t>2 </a:t>
-            </a:r>
-            <a:r>
-              <a:rPr lang="en-VN" sz="2000"/>
-              <a:t>số thực (Phép chia).</a:t>
-            </a:r>
-            <a:endParaRPr lang="en-VN" sz="2000" dirty="0"/>
-          </a:p>
-          <a:p>
-            <a:pPr>
-              <a:lnSpc>
-                <a:spcPct val="150000"/>
-              </a:lnSpc>
-            </a:pPr>
-            <a:r>
-              <a:rPr lang="en-VN" sz="2000" dirty="0"/>
+            <a:r>
+              <a:rPr lang="en-VN" dirty="0"/>
+              <a:t>6. . Viết function tính thương 2 số thực (Phép chia).</a:t>
+            </a:r>
+          </a:p>
+          <a:p>
+            <a:r>
+              <a:rPr lang="en-VN" dirty="0"/>
               <a:t>7. Xây dựng class </a:t>
             </a:r>
             <a:r>
-              <a:rPr lang="en-VN" sz="2000" b="1" dirty="0"/>
+              <a:rPr lang="en-VN" b="1" dirty="0"/>
               <a:t>Employee</a:t>
             </a:r>
             <a:r>
-              <a:rPr lang="en-VN" sz="2000" dirty="0"/>
+              <a:rPr lang="en-VN" dirty="0"/>
               <a:t>, có các thuộc tính tên (</a:t>
             </a:r>
             <a:r>
-              <a:rPr lang="en-VN" sz="2000" b="1" dirty="0"/>
+              <a:rPr lang="en-VN" b="1" dirty="0"/>
               <a:t>name</a:t>
             </a:r>
             <a:r>
-              <a:rPr lang="en-VN" sz="2000" dirty="0"/>
+              <a:rPr lang="en-VN" dirty="0"/>
               <a:t>) và năm bắt đầu công việc (</a:t>
             </a:r>
             <a:r>
-              <a:rPr lang="en-VN" sz="2000" b="1" dirty="0"/>
+              <a:rPr lang="en-VN" b="1" dirty="0"/>
               <a:t>startYear</a:t>
             </a:r>
             <a:r>
-              <a:rPr lang="en-VN" sz="2000" dirty="0"/>
+              <a:rPr lang="en-VN" dirty="0"/>
               <a:t>). </a:t>
             </a:r>
           </a:p>
           <a:p>
-            <a:pPr>
-              <a:lnSpc>
-                <a:spcPct val="150000"/>
-              </a:lnSpc>
-            </a:pPr>
-            <a:r>
-              <a:rPr lang="en-VN" sz="2000" dirty="0"/>
+            <a:r>
+              <a:rPr lang="en-VN" dirty="0"/>
               <a:t>Trong class có 1 hàm </a:t>
             </a:r>
             <a:r>
-              <a:rPr lang="en-VN" sz="2000" b="1" dirty="0"/>
+              <a:rPr lang="en-VN" b="1" dirty="0"/>
               <a:t>display</a:t>
             </a:r>
             <a:r>
-              <a:rPr lang="en-VN" sz="2000" dirty="0"/>
+              <a:rPr lang="en-VN" dirty="0"/>
               <a:t>() Để hiện thị thông tin tên và năm bắt đầu công việc.</a:t>
             </a:r>
           </a:p>
           <a:p>
-            <a:pPr>
-              <a:lnSpc>
-                <a:spcPct val="150000"/>
-              </a:lnSpc>
-            </a:pPr>
-            <a:r>
-              <a:rPr lang="en-VN" sz="2000" dirty="0"/>
+            <a:r>
+              <a:rPr lang="en-VN" dirty="0"/>
               <a:t>Nếu nhân viên có số năm </a:t>
             </a:r>
             <a:r>
-              <a:rPr lang="en-VN" sz="2000" b="1" dirty="0"/>
+              <a:rPr lang="en-VN" b="1" dirty="0"/>
               <a:t>làm việc quá 20 năm</a:t>
             </a:r>
             <a:r>
-              <a:rPr lang="en-VN" sz="2000" dirty="0"/>
+              <a:rPr lang="en-VN" dirty="0"/>
               <a:t> thì sẽ được </a:t>
             </a:r>
             <a:r>
-              <a:rPr lang="en-VN" sz="2000" b="1" dirty="0"/>
+              <a:rPr lang="en-VN" b="1" dirty="0"/>
               <a:t>nghỉ hưu</a:t>
             </a:r>
             <a:r>
-              <a:rPr lang="en-VN" sz="2000" dirty="0"/>
+              <a:rPr lang="en-VN" dirty="0"/>
               <a:t>. Trong Class thêm 1 function </a:t>
             </a:r>
             <a:r>
-              <a:rPr lang="en-VN" sz="2000" b="1" dirty="0"/>
+              <a:rPr lang="en-VN" b="1" dirty="0"/>
               <a:t>bool</a:t>
             </a:r>
             <a:r>
-              <a:rPr lang="en-VN" sz="2000" dirty="0"/>
+              <a:rPr lang="en-VN" dirty="0"/>
               <a:t> </a:t>
             </a:r>
             <a:r>
-              <a:rPr lang="en-VN" sz="2000" b="1" dirty="0"/>
+              <a:rPr lang="en-VN" b="1" dirty="0"/>
               <a:t>isRetired</a:t>
             </a:r>
             <a:r>
-              <a:rPr lang="en-VN" sz="2000" dirty="0"/>
+              <a:rPr lang="en-VN" dirty="0"/>
               <a:t>() để kiểm tra nhân viên đó đã nghỉ hưu hay chưa.</a:t>
             </a:r>
           </a:p>
           <a:p>
-            <a:pPr>
-              <a:lnSpc>
-                <a:spcPct val="150000"/>
-              </a:lnSpc>
-            </a:pPr>
-            <a:r>
-              <a:rPr lang="en-VN" sz="2000" dirty="0"/>
+            <a:r>
+              <a:rPr lang="en-VN" dirty="0"/>
               <a:t>Tạo 1 nhân viên và hiển thị các dữ liệu ở hàm main.</a:t>
             </a:r>
+          </a:p>
+          <a:p>
+            <a:endParaRPr lang="en-VN" dirty="0"/>
           </a:p>
         </p:txBody>
       </p:sp>

</xml_diff>

<commit_message>
update course lesson 2
</commit_message>
<xml_diff>
--- a/buoi2_basicdart/[2- Flutter] Basic dart 1.pptx
+++ b/buoi2_basicdart/[2- Flutter] Basic dart 1.pptx
@@ -276,7 +276,7 @@
           <a:p>
             <a:fld id="{825924F4-B343-0240-8396-7156ADA96000}" type="datetimeFigureOut">
               <a:rPr lang="en-VN" smtClean="0"/>
-              <a:t>04/06/2022</a:t>
+              <a:t>06/06/2022</a:t>
             </a:fld>
             <a:endParaRPr lang="en-VN"/>
           </a:p>
@@ -476,7 +476,7 @@
           <a:p>
             <a:fld id="{825924F4-B343-0240-8396-7156ADA96000}" type="datetimeFigureOut">
               <a:rPr lang="en-VN" smtClean="0"/>
-              <a:t>04/06/2022</a:t>
+              <a:t>06/06/2022</a:t>
             </a:fld>
             <a:endParaRPr lang="en-VN"/>
           </a:p>
@@ -686,7 +686,7 @@
           <a:p>
             <a:fld id="{825924F4-B343-0240-8396-7156ADA96000}" type="datetimeFigureOut">
               <a:rPr lang="en-VN" smtClean="0"/>
-              <a:t>04/06/2022</a:t>
+              <a:t>06/06/2022</a:t>
             </a:fld>
             <a:endParaRPr lang="en-VN"/>
           </a:p>
@@ -886,7 +886,7 @@
           <a:p>
             <a:fld id="{825924F4-B343-0240-8396-7156ADA96000}" type="datetimeFigureOut">
               <a:rPr lang="en-VN" smtClean="0"/>
-              <a:t>04/06/2022</a:t>
+              <a:t>06/06/2022</a:t>
             </a:fld>
             <a:endParaRPr lang="en-VN"/>
           </a:p>
@@ -1162,7 +1162,7 @@
           <a:p>
             <a:fld id="{825924F4-B343-0240-8396-7156ADA96000}" type="datetimeFigureOut">
               <a:rPr lang="en-VN" smtClean="0"/>
-              <a:t>04/06/2022</a:t>
+              <a:t>06/06/2022</a:t>
             </a:fld>
             <a:endParaRPr lang="en-VN"/>
           </a:p>
@@ -1430,7 +1430,7 @@
           <a:p>
             <a:fld id="{825924F4-B343-0240-8396-7156ADA96000}" type="datetimeFigureOut">
               <a:rPr lang="en-VN" smtClean="0"/>
-              <a:t>04/06/2022</a:t>
+              <a:t>06/06/2022</a:t>
             </a:fld>
             <a:endParaRPr lang="en-VN"/>
           </a:p>
@@ -1845,7 +1845,7 @@
           <a:p>
             <a:fld id="{825924F4-B343-0240-8396-7156ADA96000}" type="datetimeFigureOut">
               <a:rPr lang="en-VN" smtClean="0"/>
-              <a:t>04/06/2022</a:t>
+              <a:t>06/06/2022</a:t>
             </a:fld>
             <a:endParaRPr lang="en-VN"/>
           </a:p>
@@ -1987,7 +1987,7 @@
           <a:p>
             <a:fld id="{825924F4-B343-0240-8396-7156ADA96000}" type="datetimeFigureOut">
               <a:rPr lang="en-VN" smtClean="0"/>
-              <a:t>04/06/2022</a:t>
+              <a:t>06/06/2022</a:t>
             </a:fld>
             <a:endParaRPr lang="en-VN"/>
           </a:p>
@@ -2100,7 +2100,7 @@
           <a:p>
             <a:fld id="{825924F4-B343-0240-8396-7156ADA96000}" type="datetimeFigureOut">
               <a:rPr lang="en-VN" smtClean="0"/>
-              <a:t>04/06/2022</a:t>
+              <a:t>06/06/2022</a:t>
             </a:fld>
             <a:endParaRPr lang="en-VN"/>
           </a:p>
@@ -2413,7 +2413,7 @@
           <a:p>
             <a:fld id="{825924F4-B343-0240-8396-7156ADA96000}" type="datetimeFigureOut">
               <a:rPr lang="en-VN" smtClean="0"/>
-              <a:t>04/06/2022</a:t>
+              <a:t>06/06/2022</a:t>
             </a:fld>
             <a:endParaRPr lang="en-VN"/>
           </a:p>
@@ -2702,7 +2702,7 @@
           <a:p>
             <a:fld id="{825924F4-B343-0240-8396-7156ADA96000}" type="datetimeFigureOut">
               <a:rPr lang="en-VN" smtClean="0"/>
-              <a:t>04/06/2022</a:t>
+              <a:t>06/06/2022</a:t>
             </a:fld>
             <a:endParaRPr lang="en-VN"/>
           </a:p>
@@ -2945,7 +2945,7 @@
           <a:p>
             <a:fld id="{825924F4-B343-0240-8396-7156ADA96000}" type="datetimeFigureOut">
               <a:rPr lang="en-VN" smtClean="0"/>
-              <a:t>04/06/2022</a:t>
+              <a:t>06/06/2022</a:t>
             </a:fld>
             <a:endParaRPr lang="en-VN"/>
           </a:p>
@@ -6047,7 +6047,7 @@
         </p:nvSpPr>
         <p:spPr>
           <a:xfrm>
-            <a:off x="6243397" y="4848221"/>
+            <a:off x="6256097" y="4848221"/>
             <a:ext cx="1522212" cy="461665"/>
           </a:xfrm>
           <a:prstGeom prst="rect">

</xml_diff>